<commit_message>
Update figures as print exports
</commit_message>
<xml_diff>
--- a/figures/Ex Fig 1.pptx
+++ b/figures/Ex Fig 1.pptx
@@ -3866,8 +3866,8 @@
         </p:nvSpPr>
         <p:spPr>
           <a:xfrm>
-            <a:off x="3618066" y="6235550"/>
-            <a:ext cx="554960" cy="246221"/>
+            <a:off x="3390439" y="6235550"/>
+            <a:ext cx="782587" cy="246221"/>
           </a:xfrm>
           <a:prstGeom prst="rect">
             <a:avLst/>
@@ -3889,7 +3889,7 @@
                 <a:latin typeface="Arial" panose="020B0604020202020204" pitchFamily="34" charset="0"/>
                 <a:cs typeface="Arial" panose="020B0604020202020204" pitchFamily="34" charset="0"/>
               </a:rPr>
-              <a:t>RCVQ</a:t>
+              <a:t>log RCVQ</a:t>
             </a:r>
             <a:endParaRPr lang="en-US" sz="1000" b="1" baseline="-25000" dirty="0">
               <a:latin typeface="Arial" panose="020B0604020202020204" pitchFamily="34" charset="0"/>
@@ -3912,8 +3912,8 @@
         </p:nvSpPr>
         <p:spPr>
           <a:xfrm>
-            <a:off x="3610051" y="6481771"/>
-            <a:ext cx="562975" cy="246221"/>
+            <a:off x="3382425" y="6481771"/>
+            <a:ext cx="790601" cy="246221"/>
           </a:xfrm>
           <a:prstGeom prst="rect">
             <a:avLst/>
@@ -3935,7 +3935,7 @@
                 <a:latin typeface="Arial" panose="020B0604020202020204" pitchFamily="34" charset="0"/>
                 <a:cs typeface="Arial" panose="020B0604020202020204" pitchFamily="34" charset="0"/>
               </a:rPr>
-              <a:t>RCVM</a:t>
+              <a:t>log RCVM</a:t>
             </a:r>
             <a:endParaRPr lang="en-US" sz="1000" b="1" baseline="-25000" dirty="0">
               <a:latin typeface="Arial" panose="020B0604020202020204" pitchFamily="34" charset="0"/>

</xml_diff>

<commit_message>
Add other problem and update data figures
</commit_message>
<xml_diff>
--- a/figures/Ex Fig 1.pptx
+++ b/figures/Ex Fig 1.pptx
@@ -197,7 +197,7 @@
           <a:p>
             <a:fld id="{B19977C2-3852-6343-8FB6-75798599EF47}" type="datetimeFigureOut">
               <a:rPr lang="en-US" smtClean="0"/>
-              <a:t>9/5/24</a:t>
+              <a:t>9/6/24</a:t>
             </a:fld>
             <a:endParaRPr lang="en-US"/>
           </a:p>
@@ -684,7 +684,7 @@
           <a:p>
             <a:fld id="{49D16157-31ED-214D-A6E8-583A2FDE31BF}" type="datetimeFigureOut">
               <a:rPr lang="en-US" smtClean="0"/>
-              <a:t>9/5/24</a:t>
+              <a:t>9/6/24</a:t>
             </a:fld>
             <a:endParaRPr lang="en-US"/>
           </a:p>
@@ -854,7 +854,7 @@
           <a:p>
             <a:fld id="{49D16157-31ED-214D-A6E8-583A2FDE31BF}" type="datetimeFigureOut">
               <a:rPr lang="en-US" smtClean="0"/>
-              <a:t>9/5/24</a:t>
+              <a:t>9/6/24</a:t>
             </a:fld>
             <a:endParaRPr lang="en-US"/>
           </a:p>
@@ -1034,7 +1034,7 @@
           <a:p>
             <a:fld id="{49D16157-31ED-214D-A6E8-583A2FDE31BF}" type="datetimeFigureOut">
               <a:rPr lang="en-US" smtClean="0"/>
-              <a:t>9/5/24</a:t>
+              <a:t>9/6/24</a:t>
             </a:fld>
             <a:endParaRPr lang="en-US"/>
           </a:p>
@@ -1204,7 +1204,7 @@
           <a:p>
             <a:fld id="{49D16157-31ED-214D-A6E8-583A2FDE31BF}" type="datetimeFigureOut">
               <a:rPr lang="en-US" smtClean="0"/>
-              <a:t>9/5/24</a:t>
+              <a:t>9/6/24</a:t>
             </a:fld>
             <a:endParaRPr lang="en-US"/>
           </a:p>
@@ -1450,7 +1450,7 @@
           <a:p>
             <a:fld id="{49D16157-31ED-214D-A6E8-583A2FDE31BF}" type="datetimeFigureOut">
               <a:rPr lang="en-US" smtClean="0"/>
-              <a:t>9/5/24</a:t>
+              <a:t>9/6/24</a:t>
             </a:fld>
             <a:endParaRPr lang="en-US"/>
           </a:p>
@@ -1682,7 +1682,7 @@
           <a:p>
             <a:fld id="{49D16157-31ED-214D-A6E8-583A2FDE31BF}" type="datetimeFigureOut">
               <a:rPr lang="en-US" smtClean="0"/>
-              <a:t>9/5/24</a:t>
+              <a:t>9/6/24</a:t>
             </a:fld>
             <a:endParaRPr lang="en-US"/>
           </a:p>
@@ -2049,7 +2049,7 @@
           <a:p>
             <a:fld id="{49D16157-31ED-214D-A6E8-583A2FDE31BF}" type="datetimeFigureOut">
               <a:rPr lang="en-US" smtClean="0"/>
-              <a:t>9/5/24</a:t>
+              <a:t>9/6/24</a:t>
             </a:fld>
             <a:endParaRPr lang="en-US"/>
           </a:p>
@@ -2167,7 +2167,7 @@
           <a:p>
             <a:fld id="{49D16157-31ED-214D-A6E8-583A2FDE31BF}" type="datetimeFigureOut">
               <a:rPr lang="en-US" smtClean="0"/>
-              <a:t>9/5/24</a:t>
+              <a:t>9/6/24</a:t>
             </a:fld>
             <a:endParaRPr lang="en-US"/>
           </a:p>
@@ -2262,7 +2262,7 @@
           <a:p>
             <a:fld id="{49D16157-31ED-214D-A6E8-583A2FDE31BF}" type="datetimeFigureOut">
               <a:rPr lang="en-US" smtClean="0"/>
-              <a:t>9/5/24</a:t>
+              <a:t>9/6/24</a:t>
             </a:fld>
             <a:endParaRPr lang="en-US"/>
           </a:p>
@@ -2539,7 +2539,7 @@
           <a:p>
             <a:fld id="{49D16157-31ED-214D-A6E8-583A2FDE31BF}" type="datetimeFigureOut">
               <a:rPr lang="en-US" smtClean="0"/>
-              <a:t>9/5/24</a:t>
+              <a:t>9/6/24</a:t>
             </a:fld>
             <a:endParaRPr lang="en-US"/>
           </a:p>
@@ -2796,7 +2796,7 @@
           <a:p>
             <a:fld id="{49D16157-31ED-214D-A6E8-583A2FDE31BF}" type="datetimeFigureOut">
               <a:rPr lang="en-US" smtClean="0"/>
-              <a:t>9/5/24</a:t>
+              <a:t>9/6/24</a:t>
             </a:fld>
             <a:endParaRPr lang="en-US"/>
           </a:p>
@@ -3009,7 +3009,7 @@
           <a:p>
             <a:fld id="{49D16157-31ED-214D-A6E8-583A2FDE31BF}" type="datetimeFigureOut">
               <a:rPr lang="en-US" smtClean="0"/>
-              <a:t>9/5/24</a:t>
+              <a:t>9/6/24</a:t>
             </a:fld>
             <a:endParaRPr lang="en-US"/>
           </a:p>
@@ -4571,12 +4571,16 @@
           <a:p>
             <a:pPr algn="ctr"/>
             <a:r>
-              <a:rPr lang="en-US" sz="1000" dirty="0">
+              <a:rPr lang="en-US" sz="1000" dirty="0" err="1">
                 <a:latin typeface="Arial" panose="020B0604020202020204" pitchFamily="34" charset="0"/>
                 <a:cs typeface="Arial" panose="020B0604020202020204" pitchFamily="34" charset="0"/>
               </a:rPr>
-              <a:t>0</a:t>
-            </a:r>
+              <a:t>NaN</a:t>
+            </a:r>
+            <a:endParaRPr lang="en-US" sz="1000" dirty="0">
+              <a:latin typeface="Arial" panose="020B0604020202020204" pitchFamily="34" charset="0"/>
+              <a:cs typeface="Arial" panose="020B0604020202020204" pitchFamily="34" charset="0"/>
+            </a:endParaRPr>
           </a:p>
         </p:txBody>
       </p:sp>
@@ -4655,12 +4659,16 @@
           <a:p>
             <a:pPr algn="ctr"/>
             <a:r>
-              <a:rPr lang="en-US" sz="1000" dirty="0">
+              <a:rPr lang="en-US" sz="1000" dirty="0" err="1">
                 <a:latin typeface="Arial" panose="020B0604020202020204" pitchFamily="34" charset="0"/>
                 <a:cs typeface="Arial" panose="020B0604020202020204" pitchFamily="34" charset="0"/>
               </a:rPr>
-              <a:t>0</a:t>
-            </a:r>
+              <a:t>NaN</a:t>
+            </a:r>
+            <a:endParaRPr lang="en-US" sz="1000" dirty="0">
+              <a:latin typeface="Arial" panose="020B0604020202020204" pitchFamily="34" charset="0"/>
+              <a:cs typeface="Arial" panose="020B0604020202020204" pitchFamily="34" charset="0"/>
+            </a:endParaRPr>
           </a:p>
         </p:txBody>
       </p:sp>

</xml_diff>